<commit_message>
added pdf of presentations
</commit_message>
<xml_diff>
--- a/03_packages/python_packages.pptx
+++ b/03_packages/python_packages.pptx
@@ -279,7 +279,7 @@
           <a:p>
             <a:fld id="{9AF1CAD7-6131-6447-8583-4CFB52708ADC}" type="datetimeFigureOut">
               <a:rPr lang="en-NO" smtClean="0"/>
-              <a:t>20/09/2022</a:t>
+              <a:t>28/09/2022</a:t>
             </a:fld>
             <a:endParaRPr lang="en-NO"/>
           </a:p>
@@ -479,7 +479,7 @@
           <a:p>
             <a:fld id="{9AF1CAD7-6131-6447-8583-4CFB52708ADC}" type="datetimeFigureOut">
               <a:rPr lang="en-NO" smtClean="0"/>
-              <a:t>20/09/2022</a:t>
+              <a:t>28/09/2022</a:t>
             </a:fld>
             <a:endParaRPr lang="en-NO"/>
           </a:p>
@@ -689,7 +689,7 @@
           <a:p>
             <a:fld id="{9AF1CAD7-6131-6447-8583-4CFB52708ADC}" type="datetimeFigureOut">
               <a:rPr lang="en-NO" smtClean="0"/>
-              <a:t>20/09/2022</a:t>
+              <a:t>28/09/2022</a:t>
             </a:fld>
             <a:endParaRPr lang="en-NO"/>
           </a:p>
@@ -889,7 +889,7 @@
           <a:p>
             <a:fld id="{9AF1CAD7-6131-6447-8583-4CFB52708ADC}" type="datetimeFigureOut">
               <a:rPr lang="en-NO" smtClean="0"/>
-              <a:t>20/09/2022</a:t>
+              <a:t>28/09/2022</a:t>
             </a:fld>
             <a:endParaRPr lang="en-NO"/>
           </a:p>
@@ -1165,7 +1165,7 @@
           <a:p>
             <a:fld id="{9AF1CAD7-6131-6447-8583-4CFB52708ADC}" type="datetimeFigureOut">
               <a:rPr lang="en-NO" smtClean="0"/>
-              <a:t>20/09/2022</a:t>
+              <a:t>28/09/2022</a:t>
             </a:fld>
             <a:endParaRPr lang="en-NO"/>
           </a:p>
@@ -1433,7 +1433,7 @@
           <a:p>
             <a:fld id="{9AF1CAD7-6131-6447-8583-4CFB52708ADC}" type="datetimeFigureOut">
               <a:rPr lang="en-NO" smtClean="0"/>
-              <a:t>20/09/2022</a:t>
+              <a:t>28/09/2022</a:t>
             </a:fld>
             <a:endParaRPr lang="en-NO"/>
           </a:p>
@@ -1848,7 +1848,7 @@
           <a:p>
             <a:fld id="{9AF1CAD7-6131-6447-8583-4CFB52708ADC}" type="datetimeFigureOut">
               <a:rPr lang="en-NO" smtClean="0"/>
-              <a:t>20/09/2022</a:t>
+              <a:t>28/09/2022</a:t>
             </a:fld>
             <a:endParaRPr lang="en-NO"/>
           </a:p>
@@ -1990,7 +1990,7 @@
           <a:p>
             <a:fld id="{9AF1CAD7-6131-6447-8583-4CFB52708ADC}" type="datetimeFigureOut">
               <a:rPr lang="en-NO" smtClean="0"/>
-              <a:t>20/09/2022</a:t>
+              <a:t>28/09/2022</a:t>
             </a:fld>
             <a:endParaRPr lang="en-NO"/>
           </a:p>
@@ -2103,7 +2103,7 @@
           <a:p>
             <a:fld id="{9AF1CAD7-6131-6447-8583-4CFB52708ADC}" type="datetimeFigureOut">
               <a:rPr lang="en-NO" smtClean="0"/>
-              <a:t>20/09/2022</a:t>
+              <a:t>28/09/2022</a:t>
             </a:fld>
             <a:endParaRPr lang="en-NO"/>
           </a:p>
@@ -2416,7 +2416,7 @@
           <a:p>
             <a:fld id="{9AF1CAD7-6131-6447-8583-4CFB52708ADC}" type="datetimeFigureOut">
               <a:rPr lang="en-NO" smtClean="0"/>
-              <a:t>20/09/2022</a:t>
+              <a:t>28/09/2022</a:t>
             </a:fld>
             <a:endParaRPr lang="en-NO"/>
           </a:p>
@@ -2705,7 +2705,7 @@
           <a:p>
             <a:fld id="{9AF1CAD7-6131-6447-8583-4CFB52708ADC}" type="datetimeFigureOut">
               <a:rPr lang="en-NO" smtClean="0"/>
-              <a:t>20/09/2022</a:t>
+              <a:t>28/09/2022</a:t>
             </a:fld>
             <a:endParaRPr lang="en-NO"/>
           </a:p>
@@ -2948,7 +2948,7 @@
           <a:p>
             <a:fld id="{9AF1CAD7-6131-6447-8583-4CFB52708ADC}" type="datetimeFigureOut">
               <a:rPr lang="en-NO" smtClean="0"/>
-              <a:t>20/09/2022</a:t>
+              <a:t>28/09/2022</a:t>
             </a:fld>
             <a:endParaRPr lang="en-NO"/>
           </a:p>

</xml_diff>